<commit_message>
python run_script and associated files
</commit_message>
<xml_diff>
--- a/misc/logos_for_README.pptx
+++ b/misc/logos_for_README.pptx
@@ -7503,8 +7503,8 @@
           </p:nvSpPr>
           <p:spPr>
             <a:xfrm>
-              <a:off x="2705286" y="2895601"/>
-              <a:ext cx="4031873" cy="400110"/>
+              <a:off x="2522400" y="2947855"/>
+              <a:ext cx="4458272" cy="369332"/>
             </a:xfrm>
             <a:prstGeom prst="rect">
               <a:avLst/>
@@ -7518,13 +7518,13 @@
             <a:lstStyle/>
             <a:p>
               <a:r>
-                <a:rPr lang="en-US" sz="2000" dirty="0">
+                <a:rPr lang="en-US" dirty="0">
                   <a:latin typeface="Courier New" panose="02070309020205020404" pitchFamily="49" charset="0"/>
                   <a:cs typeface="Courier New" panose="02070309020205020404" pitchFamily="49" charset="0"/>
                 </a:rPr>
-                <a:t>S101-F010-L01-S101F010L01</a:t>
+                <a:t>S101-F010-L01-S101F010L01.fq.gz</a:t>
               </a:r>
-              <a:endParaRPr lang="en-US" sz="2800" dirty="0">
+              <a:endParaRPr lang="en-US" sz="2400" dirty="0">
                 <a:latin typeface="Courier New" panose="02070309020205020404" pitchFamily="49" charset="0"/>
                 <a:cs typeface="Courier New" panose="02070309020205020404" pitchFamily="49" charset="0"/>
               </a:endParaRPr>

</xml_diff>